<commit_message>
Some multiprocessing results and poster modifications for IPAC
These are from several months ago
</commit_message>
<xml_diff>
--- a/publications/WedgeCooling_Poster.pptx
+++ b/publications/WedgeCooling_Poster.pptx
@@ -3625,6 +3625,36 @@
           </a:p>
         </p:txBody>
       </p:sp>
+      <p:pic>
+        <p:nvPicPr>
+          <p:cNvPr id="17" name="Picture 16" descr="A black and white logo&#10;&#10;Description automatically generated">
+            <a:extLst>
+              <a:ext uri="{FF2B5EF4-FFF2-40B4-BE49-F238E27FC236}">
+                <a16:creationId xmlns:a16="http://schemas.microsoft.com/office/drawing/2014/main" id="{05C3FD70-EE14-84AB-F26F-D245AE742BE6}"/>
+              </a:ext>
+            </a:extLst>
+          </p:cNvPr>
+          <p:cNvPicPr>
+            <a:picLocks noChangeAspect="1"/>
+          </p:cNvPicPr>
+          <p:nvPr/>
+        </p:nvPicPr>
+        <p:blipFill>
+          <a:blip r:embed="rId12"/>
+          <a:stretch>
+            <a:fillRect/>
+          </a:stretch>
+        </p:blipFill>
+        <p:spPr>
+          <a:xfrm>
+            <a:off x="27329800" y="2713702"/>
+            <a:ext cx="4691701" cy="2385021"/>
+          </a:xfrm>
+          <a:prstGeom prst="rect">
+            <a:avLst/>
+          </a:prstGeom>
+        </p:spPr>
+      </p:pic>
     </p:spTree>
     <p:extLst>
       <p:ext uri="{BB962C8B-B14F-4D97-AF65-F5344CB8AC3E}">

</xml_diff>